<commit_message>
V1 of the app
All scenes linked / add 2D graph w/ the 3D one / Add a division activity / Solved hive sound problem / Set all the handles visible
</commit_message>
<xml_diff>
--- a/Assets/UI/Texture/ring_texture.pptx
+++ b/Assets/UI/Texture/ring_texture.pptx
@@ -11,6 +11,7 @@
     <p:sldId id="259" r:id="rId5"/>
     <p:sldId id="260" r:id="rId6"/>
     <p:sldId id="261" r:id="rId7"/>
+    <p:sldId id="262" r:id="rId8"/>
   </p:sldIdLst>
   <p:sldSz cx="18000663" cy="7199313"/>
   <p:notesSz cx="6858000" cy="9144000"/>
@@ -248,7 +249,7 @@
           <a:p>
             <a:fld id="{73E1331A-F6FD-4E32-9614-E92807ED1CA2}" type="datetimeFigureOut">
               <a:rPr lang="fr-FR" smtClean="0"/>
-              <a:t>27/05/2021</a:t>
+              <a:t>01/06/2021</a:t>
             </a:fld>
             <a:endParaRPr lang="fr-FR"/>
           </a:p>
@@ -418,7 +419,7 @@
           <a:p>
             <a:fld id="{73E1331A-F6FD-4E32-9614-E92807ED1CA2}" type="datetimeFigureOut">
               <a:rPr lang="fr-FR" smtClean="0"/>
-              <a:t>27/05/2021</a:t>
+              <a:t>01/06/2021</a:t>
             </a:fld>
             <a:endParaRPr lang="fr-FR"/>
           </a:p>
@@ -598,7 +599,7 @@
           <a:p>
             <a:fld id="{73E1331A-F6FD-4E32-9614-E92807ED1CA2}" type="datetimeFigureOut">
               <a:rPr lang="fr-FR" smtClean="0"/>
-              <a:t>27/05/2021</a:t>
+              <a:t>01/06/2021</a:t>
             </a:fld>
             <a:endParaRPr lang="fr-FR"/>
           </a:p>
@@ -768,7 +769,7 @@
           <a:p>
             <a:fld id="{73E1331A-F6FD-4E32-9614-E92807ED1CA2}" type="datetimeFigureOut">
               <a:rPr lang="fr-FR" smtClean="0"/>
-              <a:t>27/05/2021</a:t>
+              <a:t>01/06/2021</a:t>
             </a:fld>
             <a:endParaRPr lang="fr-FR"/>
           </a:p>
@@ -1014,7 +1015,7 @@
           <a:p>
             <a:fld id="{73E1331A-F6FD-4E32-9614-E92807ED1CA2}" type="datetimeFigureOut">
               <a:rPr lang="fr-FR" smtClean="0"/>
-              <a:t>27/05/2021</a:t>
+              <a:t>01/06/2021</a:t>
             </a:fld>
             <a:endParaRPr lang="fr-FR"/>
           </a:p>
@@ -1246,7 +1247,7 @@
           <a:p>
             <a:fld id="{73E1331A-F6FD-4E32-9614-E92807ED1CA2}" type="datetimeFigureOut">
               <a:rPr lang="fr-FR" smtClean="0"/>
-              <a:t>27/05/2021</a:t>
+              <a:t>01/06/2021</a:t>
             </a:fld>
             <a:endParaRPr lang="fr-FR"/>
           </a:p>
@@ -1613,7 +1614,7 @@
           <a:p>
             <a:fld id="{73E1331A-F6FD-4E32-9614-E92807ED1CA2}" type="datetimeFigureOut">
               <a:rPr lang="fr-FR" smtClean="0"/>
-              <a:t>27/05/2021</a:t>
+              <a:t>01/06/2021</a:t>
             </a:fld>
             <a:endParaRPr lang="fr-FR"/>
           </a:p>
@@ -1731,7 +1732,7 @@
           <a:p>
             <a:fld id="{73E1331A-F6FD-4E32-9614-E92807ED1CA2}" type="datetimeFigureOut">
               <a:rPr lang="fr-FR" smtClean="0"/>
-              <a:t>27/05/2021</a:t>
+              <a:t>01/06/2021</a:t>
             </a:fld>
             <a:endParaRPr lang="fr-FR"/>
           </a:p>
@@ -1826,7 +1827,7 @@
           <a:p>
             <a:fld id="{73E1331A-F6FD-4E32-9614-E92807ED1CA2}" type="datetimeFigureOut">
               <a:rPr lang="fr-FR" smtClean="0"/>
-              <a:t>27/05/2021</a:t>
+              <a:t>01/06/2021</a:t>
             </a:fld>
             <a:endParaRPr lang="fr-FR"/>
           </a:p>
@@ -2103,7 +2104,7 @@
           <a:p>
             <a:fld id="{73E1331A-F6FD-4E32-9614-E92807ED1CA2}" type="datetimeFigureOut">
               <a:rPr lang="fr-FR" smtClean="0"/>
-              <a:t>27/05/2021</a:t>
+              <a:t>01/06/2021</a:t>
             </a:fld>
             <a:endParaRPr lang="fr-FR"/>
           </a:p>
@@ -2360,7 +2361,7 @@
           <a:p>
             <a:fld id="{73E1331A-F6FD-4E32-9614-E92807ED1CA2}" type="datetimeFigureOut">
               <a:rPr lang="fr-FR" smtClean="0"/>
-              <a:t>27/05/2021</a:t>
+              <a:t>01/06/2021</a:t>
             </a:fld>
             <a:endParaRPr lang="fr-FR"/>
           </a:p>
@@ -2573,7 +2574,7 @@
           <a:p>
             <a:fld id="{73E1331A-F6FD-4E32-9614-E92807ED1CA2}" type="datetimeFigureOut">
               <a:rPr lang="fr-FR" smtClean="0"/>
-              <a:t>27/05/2021</a:t>
+              <a:t>01/06/2021</a:t>
             </a:fld>
             <a:endParaRPr lang="fr-FR"/>
           </a:p>
@@ -6523,6 +6524,477 @@
 </p:sld>
 </file>
 
+<file path=ppt/slides/slide7.xml><?xml version="1.0" encoding="utf-8"?>
+<p:sld xmlns:a="http://schemas.openxmlformats.org/drawingml/2006/main" xmlns:r="http://schemas.openxmlformats.org/officeDocument/2006/relationships" xmlns:p="http://schemas.openxmlformats.org/presentationml/2006/main">
+  <p:cSld>
+    <p:spTree>
+      <p:nvGrpSpPr>
+        <p:cNvPr id="1" name=""/>
+        <p:cNvGrpSpPr/>
+        <p:nvPr/>
+      </p:nvGrpSpPr>
+      <p:grpSpPr>
+        <a:xfrm>
+          <a:off x="0" y="0"/>
+          <a:ext cx="0" cy="0"/>
+          <a:chOff x="0" y="0"/>
+          <a:chExt cx="0" cy="0"/>
+        </a:xfrm>
+      </p:grpSpPr>
+      <p:sp>
+        <p:nvSpPr>
+          <p:cNvPr id="6" name="Rectangle 5">
+            <a:extLst>
+              <a:ext uri="{FF2B5EF4-FFF2-40B4-BE49-F238E27FC236}">
+                <a16:creationId xmlns:a16="http://schemas.microsoft.com/office/drawing/2014/main" id="{3B825091-989B-44B5-BB01-A824A3AFC56A}"/>
+              </a:ext>
+            </a:extLst>
+          </p:cNvPr>
+          <p:cNvSpPr/>
+          <p:nvPr/>
+        </p:nvSpPr>
+        <p:spPr>
+          <a:xfrm>
+            <a:off x="0" y="0"/>
+            <a:ext cx="18000663" cy="7199313"/>
+          </a:xfrm>
+          <a:prstGeom prst="rect">
+            <a:avLst/>
+          </a:prstGeom>
+        </p:spPr>
+        <p:style>
+          <a:lnRef idx="2">
+            <a:schemeClr val="accent1">
+              <a:shade val="50000"/>
+            </a:schemeClr>
+          </a:lnRef>
+          <a:fillRef idx="1">
+            <a:schemeClr val="accent1"/>
+          </a:fillRef>
+          <a:effectRef idx="0">
+            <a:schemeClr val="accent1"/>
+          </a:effectRef>
+          <a:fontRef idx="minor">
+            <a:schemeClr val="lt1"/>
+          </a:fontRef>
+        </p:style>
+        <p:txBody>
+          <a:bodyPr rtlCol="0" anchor="ctr"/>
+          <a:lstStyle/>
+          <a:p>
+            <a:pPr algn="ctr"/>
+            <a:endParaRPr lang="fr-FR"/>
+          </a:p>
+        </p:txBody>
+      </p:sp>
+      <p:sp>
+        <p:nvSpPr>
+          <p:cNvPr id="5" name="Rectangle : coins arrondis 4">
+            <a:extLst>
+              <a:ext uri="{FF2B5EF4-FFF2-40B4-BE49-F238E27FC236}">
+                <a16:creationId xmlns:a16="http://schemas.microsoft.com/office/drawing/2014/main" id="{A89E3965-9C18-4481-988C-6E7220007C10}"/>
+              </a:ext>
+            </a:extLst>
+          </p:cNvPr>
+          <p:cNvSpPr/>
+          <p:nvPr/>
+        </p:nvSpPr>
+        <p:spPr>
+          <a:xfrm>
+            <a:off x="320040" y="4724400"/>
+            <a:ext cx="17100000" cy="2295255"/>
+          </a:xfrm>
+          <a:custGeom>
+            <a:avLst/>
+            <a:gdLst>
+              <a:gd name="connsiteX0" fmla="*/ 0 w 17100000"/>
+              <a:gd name="connsiteY0" fmla="*/ 392518 h 2355059"/>
+              <a:gd name="connsiteX1" fmla="*/ 392518 w 17100000"/>
+              <a:gd name="connsiteY1" fmla="*/ 0 h 2355059"/>
+              <a:gd name="connsiteX2" fmla="*/ 16707482 w 17100000"/>
+              <a:gd name="connsiteY2" fmla="*/ 0 h 2355059"/>
+              <a:gd name="connsiteX3" fmla="*/ 17100000 w 17100000"/>
+              <a:gd name="connsiteY3" fmla="*/ 392518 h 2355059"/>
+              <a:gd name="connsiteX4" fmla="*/ 17100000 w 17100000"/>
+              <a:gd name="connsiteY4" fmla="*/ 1962541 h 2355059"/>
+              <a:gd name="connsiteX5" fmla="*/ 16707482 w 17100000"/>
+              <a:gd name="connsiteY5" fmla="*/ 2355059 h 2355059"/>
+              <a:gd name="connsiteX6" fmla="*/ 392518 w 17100000"/>
+              <a:gd name="connsiteY6" fmla="*/ 2355059 h 2355059"/>
+              <a:gd name="connsiteX7" fmla="*/ 0 w 17100000"/>
+              <a:gd name="connsiteY7" fmla="*/ 1962541 h 2355059"/>
+              <a:gd name="connsiteX8" fmla="*/ 0 w 17100000"/>
+              <a:gd name="connsiteY8" fmla="*/ 392518 h 2355059"/>
+              <a:gd name="connsiteX0" fmla="*/ 0 w 17100000"/>
+              <a:gd name="connsiteY0" fmla="*/ 392518 h 2355059"/>
+              <a:gd name="connsiteX1" fmla="*/ 392518 w 17100000"/>
+              <a:gd name="connsiteY1" fmla="*/ 0 h 2355059"/>
+              <a:gd name="connsiteX2" fmla="*/ 1381438 w 17100000"/>
+              <a:gd name="connsiteY2" fmla="*/ 1 h 2355059"/>
+              <a:gd name="connsiteX3" fmla="*/ 16707482 w 17100000"/>
+              <a:gd name="connsiteY3" fmla="*/ 0 h 2355059"/>
+              <a:gd name="connsiteX4" fmla="*/ 17100000 w 17100000"/>
+              <a:gd name="connsiteY4" fmla="*/ 392518 h 2355059"/>
+              <a:gd name="connsiteX5" fmla="*/ 17100000 w 17100000"/>
+              <a:gd name="connsiteY5" fmla="*/ 1962541 h 2355059"/>
+              <a:gd name="connsiteX6" fmla="*/ 16707482 w 17100000"/>
+              <a:gd name="connsiteY6" fmla="*/ 2355059 h 2355059"/>
+              <a:gd name="connsiteX7" fmla="*/ 392518 w 17100000"/>
+              <a:gd name="connsiteY7" fmla="*/ 2355059 h 2355059"/>
+              <a:gd name="connsiteX8" fmla="*/ 0 w 17100000"/>
+              <a:gd name="connsiteY8" fmla="*/ 1962541 h 2355059"/>
+              <a:gd name="connsiteX9" fmla="*/ 0 w 17100000"/>
+              <a:gd name="connsiteY9" fmla="*/ 392518 h 2355059"/>
+              <a:gd name="connsiteX0" fmla="*/ 0 w 17100000"/>
+              <a:gd name="connsiteY0" fmla="*/ 399770 h 2362311"/>
+              <a:gd name="connsiteX1" fmla="*/ 392518 w 17100000"/>
+              <a:gd name="connsiteY1" fmla="*/ 7252 h 2362311"/>
+              <a:gd name="connsiteX2" fmla="*/ 478536 w 17100000"/>
+              <a:gd name="connsiteY2" fmla="*/ 0 h 2362311"/>
+              <a:gd name="connsiteX3" fmla="*/ 1381438 w 17100000"/>
+              <a:gd name="connsiteY3" fmla="*/ 7253 h 2362311"/>
+              <a:gd name="connsiteX4" fmla="*/ 16707482 w 17100000"/>
+              <a:gd name="connsiteY4" fmla="*/ 7252 h 2362311"/>
+              <a:gd name="connsiteX5" fmla="*/ 17100000 w 17100000"/>
+              <a:gd name="connsiteY5" fmla="*/ 399770 h 2362311"/>
+              <a:gd name="connsiteX6" fmla="*/ 17100000 w 17100000"/>
+              <a:gd name="connsiteY6" fmla="*/ 1969793 h 2362311"/>
+              <a:gd name="connsiteX7" fmla="*/ 16707482 w 17100000"/>
+              <a:gd name="connsiteY7" fmla="*/ 2362311 h 2362311"/>
+              <a:gd name="connsiteX8" fmla="*/ 392518 w 17100000"/>
+              <a:gd name="connsiteY8" fmla="*/ 2362311 h 2362311"/>
+              <a:gd name="connsiteX9" fmla="*/ 0 w 17100000"/>
+              <a:gd name="connsiteY9" fmla="*/ 1969793 h 2362311"/>
+              <a:gd name="connsiteX10" fmla="*/ 0 w 17100000"/>
+              <a:gd name="connsiteY10" fmla="*/ 399770 h 2362311"/>
+              <a:gd name="connsiteX0" fmla="*/ 0 w 17100000"/>
+              <a:gd name="connsiteY0" fmla="*/ 399770 h 2362311"/>
+              <a:gd name="connsiteX1" fmla="*/ 392518 w 17100000"/>
+              <a:gd name="connsiteY1" fmla="*/ 13348 h 2362311"/>
+              <a:gd name="connsiteX2" fmla="*/ 478536 w 17100000"/>
+              <a:gd name="connsiteY2" fmla="*/ 0 h 2362311"/>
+              <a:gd name="connsiteX3" fmla="*/ 1381438 w 17100000"/>
+              <a:gd name="connsiteY3" fmla="*/ 7253 h 2362311"/>
+              <a:gd name="connsiteX4" fmla="*/ 16707482 w 17100000"/>
+              <a:gd name="connsiteY4" fmla="*/ 7252 h 2362311"/>
+              <a:gd name="connsiteX5" fmla="*/ 17100000 w 17100000"/>
+              <a:gd name="connsiteY5" fmla="*/ 399770 h 2362311"/>
+              <a:gd name="connsiteX6" fmla="*/ 17100000 w 17100000"/>
+              <a:gd name="connsiteY6" fmla="*/ 1969793 h 2362311"/>
+              <a:gd name="connsiteX7" fmla="*/ 16707482 w 17100000"/>
+              <a:gd name="connsiteY7" fmla="*/ 2362311 h 2362311"/>
+              <a:gd name="connsiteX8" fmla="*/ 392518 w 17100000"/>
+              <a:gd name="connsiteY8" fmla="*/ 2362311 h 2362311"/>
+              <a:gd name="connsiteX9" fmla="*/ 0 w 17100000"/>
+              <a:gd name="connsiteY9" fmla="*/ 1969793 h 2362311"/>
+              <a:gd name="connsiteX10" fmla="*/ 0 w 17100000"/>
+              <a:gd name="connsiteY10" fmla="*/ 399770 h 2362311"/>
+              <a:gd name="connsiteX0" fmla="*/ 0 w 17100000"/>
+              <a:gd name="connsiteY0" fmla="*/ 399770 h 2362311"/>
+              <a:gd name="connsiteX1" fmla="*/ 392518 w 17100000"/>
+              <a:gd name="connsiteY1" fmla="*/ 13348 h 2362311"/>
+              <a:gd name="connsiteX2" fmla="*/ 478536 w 17100000"/>
+              <a:gd name="connsiteY2" fmla="*/ 0 h 2362311"/>
+              <a:gd name="connsiteX3" fmla="*/ 1381438 w 17100000"/>
+              <a:gd name="connsiteY3" fmla="*/ 7253 h 2362311"/>
+              <a:gd name="connsiteX4" fmla="*/ 16707482 w 17100000"/>
+              <a:gd name="connsiteY4" fmla="*/ 7252 h 2362311"/>
+              <a:gd name="connsiteX5" fmla="*/ 17100000 w 17100000"/>
+              <a:gd name="connsiteY5" fmla="*/ 399770 h 2362311"/>
+              <a:gd name="connsiteX6" fmla="*/ 17100000 w 17100000"/>
+              <a:gd name="connsiteY6" fmla="*/ 1969793 h 2362311"/>
+              <a:gd name="connsiteX7" fmla="*/ 16707482 w 17100000"/>
+              <a:gd name="connsiteY7" fmla="*/ 2362311 h 2362311"/>
+              <a:gd name="connsiteX8" fmla="*/ 392518 w 17100000"/>
+              <a:gd name="connsiteY8" fmla="*/ 2362311 h 2362311"/>
+              <a:gd name="connsiteX9" fmla="*/ 0 w 17100000"/>
+              <a:gd name="connsiteY9" fmla="*/ 1969793 h 2362311"/>
+              <a:gd name="connsiteX10" fmla="*/ 0 w 17100000"/>
+              <a:gd name="connsiteY10" fmla="*/ 399770 h 2362311"/>
+              <a:gd name="connsiteX0" fmla="*/ 1381438 w 17100000"/>
+              <a:gd name="connsiteY0" fmla="*/ 1 h 2355059"/>
+              <a:gd name="connsiteX1" fmla="*/ 16707482 w 17100000"/>
+              <a:gd name="connsiteY1" fmla="*/ 0 h 2355059"/>
+              <a:gd name="connsiteX2" fmla="*/ 17100000 w 17100000"/>
+              <a:gd name="connsiteY2" fmla="*/ 392518 h 2355059"/>
+              <a:gd name="connsiteX3" fmla="*/ 17100000 w 17100000"/>
+              <a:gd name="connsiteY3" fmla="*/ 1962541 h 2355059"/>
+              <a:gd name="connsiteX4" fmla="*/ 16707482 w 17100000"/>
+              <a:gd name="connsiteY4" fmla="*/ 2355059 h 2355059"/>
+              <a:gd name="connsiteX5" fmla="*/ 392518 w 17100000"/>
+              <a:gd name="connsiteY5" fmla="*/ 2355059 h 2355059"/>
+              <a:gd name="connsiteX6" fmla="*/ 0 w 17100000"/>
+              <a:gd name="connsiteY6" fmla="*/ 1962541 h 2355059"/>
+              <a:gd name="connsiteX7" fmla="*/ 0 w 17100000"/>
+              <a:gd name="connsiteY7" fmla="*/ 392518 h 2355059"/>
+              <a:gd name="connsiteX8" fmla="*/ 392518 w 17100000"/>
+              <a:gd name="connsiteY8" fmla="*/ 6096 h 2355059"/>
+              <a:gd name="connsiteX9" fmla="*/ 569976 w 17100000"/>
+              <a:gd name="connsiteY9" fmla="*/ 84188 h 2355059"/>
+              <a:gd name="connsiteX0" fmla="*/ 1381438 w 17100000"/>
+              <a:gd name="connsiteY0" fmla="*/ 1 h 2355059"/>
+              <a:gd name="connsiteX1" fmla="*/ 16707482 w 17100000"/>
+              <a:gd name="connsiteY1" fmla="*/ 0 h 2355059"/>
+              <a:gd name="connsiteX2" fmla="*/ 17100000 w 17100000"/>
+              <a:gd name="connsiteY2" fmla="*/ 392518 h 2355059"/>
+              <a:gd name="connsiteX3" fmla="*/ 17100000 w 17100000"/>
+              <a:gd name="connsiteY3" fmla="*/ 1962541 h 2355059"/>
+              <a:gd name="connsiteX4" fmla="*/ 16707482 w 17100000"/>
+              <a:gd name="connsiteY4" fmla="*/ 2355059 h 2355059"/>
+              <a:gd name="connsiteX5" fmla="*/ 392518 w 17100000"/>
+              <a:gd name="connsiteY5" fmla="*/ 2355059 h 2355059"/>
+              <a:gd name="connsiteX6" fmla="*/ 0 w 17100000"/>
+              <a:gd name="connsiteY6" fmla="*/ 1962541 h 2355059"/>
+              <a:gd name="connsiteX7" fmla="*/ 0 w 17100000"/>
+              <a:gd name="connsiteY7" fmla="*/ 392518 h 2355059"/>
+              <a:gd name="connsiteX8" fmla="*/ 392518 w 17100000"/>
+              <a:gd name="connsiteY8" fmla="*/ 6096 h 2355059"/>
+              <a:gd name="connsiteX9" fmla="*/ 600456 w 17100000"/>
+              <a:gd name="connsiteY9" fmla="*/ 11036 h 2355059"/>
+              <a:gd name="connsiteX0" fmla="*/ 1381438 w 17100000"/>
+              <a:gd name="connsiteY0" fmla="*/ 1 h 2355059"/>
+              <a:gd name="connsiteX1" fmla="*/ 16707482 w 17100000"/>
+              <a:gd name="connsiteY1" fmla="*/ 0 h 2355059"/>
+              <a:gd name="connsiteX2" fmla="*/ 17100000 w 17100000"/>
+              <a:gd name="connsiteY2" fmla="*/ 392518 h 2355059"/>
+              <a:gd name="connsiteX3" fmla="*/ 17100000 w 17100000"/>
+              <a:gd name="connsiteY3" fmla="*/ 1962541 h 2355059"/>
+              <a:gd name="connsiteX4" fmla="*/ 16707482 w 17100000"/>
+              <a:gd name="connsiteY4" fmla="*/ 2355059 h 2355059"/>
+              <a:gd name="connsiteX5" fmla="*/ 392518 w 17100000"/>
+              <a:gd name="connsiteY5" fmla="*/ 2355059 h 2355059"/>
+              <a:gd name="connsiteX6" fmla="*/ 0 w 17100000"/>
+              <a:gd name="connsiteY6" fmla="*/ 1962541 h 2355059"/>
+              <a:gd name="connsiteX7" fmla="*/ 0 w 17100000"/>
+              <a:gd name="connsiteY7" fmla="*/ 392518 h 2355059"/>
+              <a:gd name="connsiteX8" fmla="*/ 392518 w 17100000"/>
+              <a:gd name="connsiteY8" fmla="*/ 6096 h 2355059"/>
+              <a:gd name="connsiteX9" fmla="*/ 606552 w 17100000"/>
+              <a:gd name="connsiteY9" fmla="*/ 4940 h 2355059"/>
+              <a:gd name="connsiteX0" fmla="*/ 1381438 w 17100000"/>
+              <a:gd name="connsiteY0" fmla="*/ 1 h 2355059"/>
+              <a:gd name="connsiteX1" fmla="*/ 16707482 w 17100000"/>
+              <a:gd name="connsiteY1" fmla="*/ 0 h 2355059"/>
+              <a:gd name="connsiteX2" fmla="*/ 17100000 w 17100000"/>
+              <a:gd name="connsiteY2" fmla="*/ 392518 h 2355059"/>
+              <a:gd name="connsiteX3" fmla="*/ 17100000 w 17100000"/>
+              <a:gd name="connsiteY3" fmla="*/ 1962541 h 2355059"/>
+              <a:gd name="connsiteX4" fmla="*/ 16707482 w 17100000"/>
+              <a:gd name="connsiteY4" fmla="*/ 2355059 h 2355059"/>
+              <a:gd name="connsiteX5" fmla="*/ 392518 w 17100000"/>
+              <a:gd name="connsiteY5" fmla="*/ 2355059 h 2355059"/>
+              <a:gd name="connsiteX6" fmla="*/ 0 w 17100000"/>
+              <a:gd name="connsiteY6" fmla="*/ 1962541 h 2355059"/>
+              <a:gd name="connsiteX7" fmla="*/ 0 w 17100000"/>
+              <a:gd name="connsiteY7" fmla="*/ 392518 h 2355059"/>
+              <a:gd name="connsiteX8" fmla="*/ 392518 w 17100000"/>
+              <a:gd name="connsiteY8" fmla="*/ 6096 h 2355059"/>
+              <a:gd name="connsiteX9" fmla="*/ 606552 w 17100000"/>
+              <a:gd name="connsiteY9" fmla="*/ 4940 h 2355059"/>
+              <a:gd name="connsiteX0" fmla="*/ 1466782 w 17100000"/>
+              <a:gd name="connsiteY0" fmla="*/ 1 h 2355059"/>
+              <a:gd name="connsiteX1" fmla="*/ 16707482 w 17100000"/>
+              <a:gd name="connsiteY1" fmla="*/ 0 h 2355059"/>
+              <a:gd name="connsiteX2" fmla="*/ 17100000 w 17100000"/>
+              <a:gd name="connsiteY2" fmla="*/ 392518 h 2355059"/>
+              <a:gd name="connsiteX3" fmla="*/ 17100000 w 17100000"/>
+              <a:gd name="connsiteY3" fmla="*/ 1962541 h 2355059"/>
+              <a:gd name="connsiteX4" fmla="*/ 16707482 w 17100000"/>
+              <a:gd name="connsiteY4" fmla="*/ 2355059 h 2355059"/>
+              <a:gd name="connsiteX5" fmla="*/ 392518 w 17100000"/>
+              <a:gd name="connsiteY5" fmla="*/ 2355059 h 2355059"/>
+              <a:gd name="connsiteX6" fmla="*/ 0 w 17100000"/>
+              <a:gd name="connsiteY6" fmla="*/ 1962541 h 2355059"/>
+              <a:gd name="connsiteX7" fmla="*/ 0 w 17100000"/>
+              <a:gd name="connsiteY7" fmla="*/ 392518 h 2355059"/>
+              <a:gd name="connsiteX8" fmla="*/ 392518 w 17100000"/>
+              <a:gd name="connsiteY8" fmla="*/ 6096 h 2355059"/>
+              <a:gd name="connsiteX9" fmla="*/ 606552 w 17100000"/>
+              <a:gd name="connsiteY9" fmla="*/ 4940 h 2355059"/>
+              <a:gd name="connsiteX0" fmla="*/ 1497262 w 17100000"/>
+              <a:gd name="connsiteY0" fmla="*/ 1 h 2355059"/>
+              <a:gd name="connsiteX1" fmla="*/ 16707482 w 17100000"/>
+              <a:gd name="connsiteY1" fmla="*/ 0 h 2355059"/>
+              <a:gd name="connsiteX2" fmla="*/ 17100000 w 17100000"/>
+              <a:gd name="connsiteY2" fmla="*/ 392518 h 2355059"/>
+              <a:gd name="connsiteX3" fmla="*/ 17100000 w 17100000"/>
+              <a:gd name="connsiteY3" fmla="*/ 1962541 h 2355059"/>
+              <a:gd name="connsiteX4" fmla="*/ 16707482 w 17100000"/>
+              <a:gd name="connsiteY4" fmla="*/ 2355059 h 2355059"/>
+              <a:gd name="connsiteX5" fmla="*/ 392518 w 17100000"/>
+              <a:gd name="connsiteY5" fmla="*/ 2355059 h 2355059"/>
+              <a:gd name="connsiteX6" fmla="*/ 0 w 17100000"/>
+              <a:gd name="connsiteY6" fmla="*/ 1962541 h 2355059"/>
+              <a:gd name="connsiteX7" fmla="*/ 0 w 17100000"/>
+              <a:gd name="connsiteY7" fmla="*/ 392518 h 2355059"/>
+              <a:gd name="connsiteX8" fmla="*/ 392518 w 17100000"/>
+              <a:gd name="connsiteY8" fmla="*/ 6096 h 2355059"/>
+              <a:gd name="connsiteX9" fmla="*/ 606552 w 17100000"/>
+              <a:gd name="connsiteY9" fmla="*/ 4940 h 2355059"/>
+            </a:gdLst>
+            <a:ahLst/>
+            <a:cxnLst>
+              <a:cxn ang="0">
+                <a:pos x="connsiteX0" y="connsiteY0"/>
+              </a:cxn>
+              <a:cxn ang="0">
+                <a:pos x="connsiteX1" y="connsiteY1"/>
+              </a:cxn>
+              <a:cxn ang="0">
+                <a:pos x="connsiteX2" y="connsiteY2"/>
+              </a:cxn>
+              <a:cxn ang="0">
+                <a:pos x="connsiteX3" y="connsiteY3"/>
+              </a:cxn>
+              <a:cxn ang="0">
+                <a:pos x="connsiteX4" y="connsiteY4"/>
+              </a:cxn>
+              <a:cxn ang="0">
+                <a:pos x="connsiteX5" y="connsiteY5"/>
+              </a:cxn>
+              <a:cxn ang="0">
+                <a:pos x="connsiteX6" y="connsiteY6"/>
+              </a:cxn>
+              <a:cxn ang="0">
+                <a:pos x="connsiteX7" y="connsiteY7"/>
+              </a:cxn>
+              <a:cxn ang="0">
+                <a:pos x="connsiteX8" y="connsiteY8"/>
+              </a:cxn>
+              <a:cxn ang="0">
+                <a:pos x="connsiteX9" y="connsiteY9"/>
+              </a:cxn>
+            </a:cxnLst>
+            <a:rect l="l" t="t" r="r" b="b"/>
+            <a:pathLst>
+              <a:path w="17100000" h="2355059">
+                <a:moveTo>
+                  <a:pt x="1497262" y="1"/>
+                </a:moveTo>
+                <a:lnTo>
+                  <a:pt x="16707482" y="0"/>
+                </a:lnTo>
+                <a:cubicBezTo>
+                  <a:pt x="16924264" y="0"/>
+                  <a:pt x="17100000" y="175736"/>
+                  <a:pt x="17100000" y="392518"/>
+                </a:cubicBezTo>
+                <a:lnTo>
+                  <a:pt x="17100000" y="1962541"/>
+                </a:lnTo>
+                <a:cubicBezTo>
+                  <a:pt x="17100000" y="2179323"/>
+                  <a:pt x="16924264" y="2355059"/>
+                  <a:pt x="16707482" y="2355059"/>
+                </a:cubicBezTo>
+                <a:lnTo>
+                  <a:pt x="392518" y="2355059"/>
+                </a:lnTo>
+                <a:cubicBezTo>
+                  <a:pt x="175736" y="2355059"/>
+                  <a:pt x="0" y="2179323"/>
+                  <a:pt x="0" y="1962541"/>
+                </a:cubicBezTo>
+                <a:lnTo>
+                  <a:pt x="0" y="392518"/>
+                </a:lnTo>
+                <a:cubicBezTo>
+                  <a:pt x="0" y="175736"/>
+                  <a:pt x="169640" y="24384"/>
+                  <a:pt x="392518" y="6096"/>
+                </a:cubicBezTo>
+                <a:cubicBezTo>
+                  <a:pt x="421191" y="1647"/>
+                  <a:pt x="606552" y="4940"/>
+                  <a:pt x="606552" y="4940"/>
+                </a:cubicBezTo>
+              </a:path>
+            </a:pathLst>
+          </a:custGeom>
+          <a:noFill/>
+          <a:ln w="114300">
+            <a:solidFill>
+              <a:schemeClr val="bg1"/>
+            </a:solidFill>
+          </a:ln>
+        </p:spPr>
+        <p:style>
+          <a:lnRef idx="2">
+            <a:schemeClr val="accent1">
+              <a:shade val="50000"/>
+            </a:schemeClr>
+          </a:lnRef>
+          <a:fillRef idx="1">
+            <a:schemeClr val="accent1"/>
+          </a:fillRef>
+          <a:effectRef idx="0">
+            <a:schemeClr val="accent1"/>
+          </a:effectRef>
+          <a:fontRef idx="minor">
+            <a:schemeClr val="lt1"/>
+          </a:fontRef>
+        </p:style>
+        <p:txBody>
+          <a:bodyPr rtlCol="0" anchor="ctr"/>
+          <a:lstStyle/>
+          <a:p>
+            <a:pPr algn="ctr"/>
+            <a:endParaRPr lang="fr-FR"/>
+          </a:p>
+        </p:txBody>
+      </p:sp>
+      <p:pic>
+        <p:nvPicPr>
+          <p:cNvPr id="3" name="Graphique 2" descr="Volume avec un remplissage uni">
+            <a:extLst>
+              <a:ext uri="{FF2B5EF4-FFF2-40B4-BE49-F238E27FC236}">
+                <a16:creationId xmlns:a16="http://schemas.microsoft.com/office/drawing/2014/main" id="{D66342C5-0E73-4B89-AABF-9D02C1C1A317}"/>
+              </a:ext>
+            </a:extLst>
+          </p:cNvPr>
+          <p:cNvPicPr>
+            <a:picLocks noChangeAspect="1"/>
+          </p:cNvPicPr>
+          <p:nvPr/>
+        </p:nvPicPr>
+        <p:blipFill>
+          <a:blip r:embed="rId2">
+            <a:extLst>
+              <a:ext uri="{28A0092B-C50C-407E-A947-70E740481C1C}">
+                <a14:useLocalDpi xmlns:a14="http://schemas.microsoft.com/office/drawing/2010/main" val="0"/>
+              </a:ext>
+              <a:ext uri="{96DAC541-7B7A-43D3-8B79-37D633B846F1}">
+                <asvg:svgBlip xmlns:asvg="http://schemas.microsoft.com/office/drawing/2016/SVG/main" r:embed="rId3"/>
+              </a:ext>
+            </a:extLst>
+          </a:blip>
+          <a:stretch>
+            <a:fillRect/>
+          </a:stretch>
+        </p:blipFill>
+        <p:spPr>
+          <a:xfrm>
+            <a:off x="1007048" y="4302760"/>
+            <a:ext cx="843280" cy="843280"/>
+          </a:xfrm>
+          <a:prstGeom prst="rect">
+            <a:avLst/>
+          </a:prstGeom>
+        </p:spPr>
+      </p:pic>
+    </p:spTree>
+    <p:extLst>
+      <p:ext uri="{BB962C8B-B14F-4D97-AF65-F5344CB8AC3E}">
+        <p14:creationId xmlns:p14="http://schemas.microsoft.com/office/powerpoint/2010/main" val="3971826155"/>
+      </p:ext>
+    </p:extLst>
+  </p:cSld>
+  <p:clrMapOvr>
+    <a:masterClrMapping/>
+  </p:clrMapOvr>
+</p:sld>
+</file>
+
 <file path=ppt/theme/theme1.xml><?xml version="1.0" encoding="utf-8"?>
 <a:theme xmlns:a="http://schemas.openxmlformats.org/drawingml/2006/main" name="Thème Office">
   <a:themeElements>

</xml_diff>